<commit_message>
new becerra slide show
</commit_message>
<xml_diff>
--- a/Discussions/Clarification Reflections.pptx
+++ b/Discussions/Clarification Reflections.pptx
@@ -6,10 +6,10 @@
     <p:sldMasterId id="2147483742" r:id="rId2"/>
   </p:sldMasterIdLst>
   <p:notesMasterIdLst>
-    <p:notesMasterId r:id="rId17"/>
+    <p:notesMasterId r:id="rId19"/>
   </p:notesMasterIdLst>
   <p:handoutMasterIdLst>
-    <p:handoutMasterId r:id="rId18"/>
+    <p:handoutMasterId r:id="rId20"/>
   </p:handoutMasterIdLst>
   <p:sldIdLst>
     <p:sldId id="623" r:id="rId3"/>
@@ -26,6 +26,8 @@
     <p:sldId id="632" r:id="rId14"/>
     <p:sldId id="629" r:id="rId15"/>
     <p:sldId id="630" r:id="rId16"/>
+    <p:sldId id="634" r:id="rId17"/>
+    <p:sldId id="635" r:id="rId18"/>
   </p:sldIdLst>
   <p:sldSz cx="12192000" cy="6858000"/>
   <p:notesSz cx="6858000" cy="9144000"/>
@@ -301,7 +303,7 @@
             <a:fld id="{40487D26-2F69-4E7E-8B30-658E0D4AE69A}" type="datetime1">
               <a:rPr lang="es-HN" smtClean="0"/>
               <a:pPr/>
-              <a:t>28/2/2023</a:t>
+              <a:t>9/3/2023</a:t>
             </a:fld>
             <a:endParaRPr lang="es-HN" dirty="0"/>
           </a:p>
@@ -3280,7 +3282,7 @@
                 <a:tabLst/>
                 <a:defRPr/>
               </a:pPr>
-              <a:t>28/2/2023</a:t>
+              <a:t>7/3/2023</a:t>
             </a:fld>
             <a:endParaRPr kumimoji="0" lang="es-HN" sz="1400" b="0" i="0" u="none" strike="noStrike" kern="1200" cap="none" spc="0" normalizeH="0" baseline="0" noProof="0">
               <a:ln>
@@ -29798,6 +29800,246 @@
 </p:sld>
 </file>
 
+<file path=ppt/slides/slide15.xml><?xml version="1.0" encoding="utf-8"?>
+<p:sld xmlns:a="http://schemas.openxmlformats.org/drawingml/2006/main" xmlns:r="http://schemas.openxmlformats.org/officeDocument/2006/relationships" xmlns:p="http://schemas.openxmlformats.org/presentationml/2006/main">
+  <p:cSld>
+    <p:spTree>
+      <p:nvGrpSpPr>
+        <p:cNvPr id="1" name=""/>
+        <p:cNvGrpSpPr/>
+        <p:nvPr/>
+      </p:nvGrpSpPr>
+      <p:grpSpPr>
+        <a:xfrm>
+          <a:off x="0" y="0"/>
+          <a:ext cx="0" cy="0"/>
+          <a:chOff x="0" y="0"/>
+          <a:chExt cx="0" cy="0"/>
+        </a:xfrm>
+      </p:grpSpPr>
+      <p:sp>
+        <p:nvSpPr>
+          <p:cNvPr id="2" name="Title 1">
+            <a:extLst>
+              <a:ext uri="{FF2B5EF4-FFF2-40B4-BE49-F238E27FC236}">
+                <a16:creationId xmlns:a16="http://schemas.microsoft.com/office/drawing/2014/main" id="{B7CC95AA-BCFB-4E37-9C57-B6A0355DE7E7}"/>
+              </a:ext>
+            </a:extLst>
+          </p:cNvPr>
+          <p:cNvSpPr>
+            <a:spLocks noGrp="1"/>
+          </p:cNvSpPr>
+          <p:nvPr>
+            <p:ph type="title"/>
+          </p:nvPr>
+        </p:nvSpPr>
+        <p:spPr/>
+        <p:txBody>
+          <a:bodyPr/>
+          <a:lstStyle/>
+          <a:p>
+            <a:r>
+              <a:rPr lang="en-US" dirty="0"/>
+              <a:t>How large are these systems?</a:t>
+            </a:r>
+          </a:p>
+        </p:txBody>
+      </p:sp>
+      <p:sp>
+        <p:nvSpPr>
+          <p:cNvPr id="3" name="Content Placeholder 2">
+            <a:extLst>
+              <a:ext uri="{FF2B5EF4-FFF2-40B4-BE49-F238E27FC236}">
+                <a16:creationId xmlns:a16="http://schemas.microsoft.com/office/drawing/2014/main" id="{B9721FA0-7AD4-4BEE-883C-4523B63499B2}"/>
+              </a:ext>
+            </a:extLst>
+          </p:cNvPr>
+          <p:cNvSpPr>
+            <a:spLocks noGrp="1"/>
+          </p:cNvSpPr>
+          <p:nvPr>
+            <p:ph idx="1"/>
+          </p:nvPr>
+        </p:nvSpPr>
+        <p:spPr/>
+        <p:txBody>
+          <a:bodyPr/>
+          <a:lstStyle/>
+          <a:p>
+            <a:r>
+              <a:rPr lang="en-US" dirty="0"/>
+              <a:t>What do you mean by “large”?</a:t>
+            </a:r>
+          </a:p>
+          <a:p>
+            <a:r>
+              <a:rPr lang="en-US" dirty="0"/>
+              <a:t>What do you mean by “systems”</a:t>
+            </a:r>
+          </a:p>
+          <a:p>
+            <a:r>
+              <a:rPr lang="en-US" dirty="0"/>
+              <a:t>What is the context?</a:t>
+            </a:r>
+          </a:p>
+          <a:p>
+            <a:r>
+              <a:rPr lang="en-US" dirty="0"/>
+              <a:t>How much does the size of these systems vary?</a:t>
+            </a:r>
+          </a:p>
+          <a:p>
+            <a:r>
+              <a:rPr lang="en-US" dirty="0"/>
+              <a:t>What else do you need to know in order to estimate how large a system will be?</a:t>
+            </a:r>
+          </a:p>
+        </p:txBody>
+      </p:sp>
+    </p:spTree>
+    <p:extLst>
+      <p:ext uri="{BB962C8B-B14F-4D97-AF65-F5344CB8AC3E}">
+        <p14:creationId xmlns:p14="http://schemas.microsoft.com/office/powerpoint/2010/main" val="1713613702"/>
+      </p:ext>
+    </p:extLst>
+  </p:cSld>
+  <p:clrMapOvr>
+    <a:masterClrMapping/>
+  </p:clrMapOvr>
+  <p:transition>
+    <p:fade/>
+  </p:transition>
+</p:sld>
+</file>
+
+<file path=ppt/slides/slide16.xml><?xml version="1.0" encoding="utf-8"?>
+<p:sld xmlns:a="http://schemas.openxmlformats.org/drawingml/2006/main" xmlns:r="http://schemas.openxmlformats.org/officeDocument/2006/relationships" xmlns:p="http://schemas.openxmlformats.org/presentationml/2006/main">
+  <p:cSld>
+    <p:spTree>
+      <p:nvGrpSpPr>
+        <p:cNvPr id="1" name=""/>
+        <p:cNvGrpSpPr/>
+        <p:nvPr/>
+      </p:nvGrpSpPr>
+      <p:grpSpPr>
+        <a:xfrm>
+          <a:off x="0" y="0"/>
+          <a:ext cx="0" cy="0"/>
+          <a:chOff x="0" y="0"/>
+          <a:chExt cx="0" cy="0"/>
+        </a:xfrm>
+      </p:grpSpPr>
+      <p:sp>
+        <p:nvSpPr>
+          <p:cNvPr id="2" name="Title 1">
+            <a:extLst>
+              <a:ext uri="{FF2B5EF4-FFF2-40B4-BE49-F238E27FC236}">
+                <a16:creationId xmlns:a16="http://schemas.microsoft.com/office/drawing/2014/main" id="{AA8095D6-9C16-45A7-9297-8AC26DB95FB5}"/>
+              </a:ext>
+            </a:extLst>
+          </p:cNvPr>
+          <p:cNvSpPr>
+            <a:spLocks noGrp="1"/>
+          </p:cNvSpPr>
+          <p:nvPr>
+            <p:ph type="title"/>
+          </p:nvPr>
+        </p:nvSpPr>
+        <p:spPr/>
+        <p:txBody>
+          <a:bodyPr/>
+          <a:lstStyle/>
+          <a:p>
+            <a:r>
+              <a:rPr lang="en-US" dirty="0"/>
+              <a:t>How large is the clarifier for a community?</a:t>
+            </a:r>
+          </a:p>
+        </p:txBody>
+      </p:sp>
+      <p:sp>
+        <p:nvSpPr>
+          <p:cNvPr id="3" name="Content Placeholder 2">
+            <a:extLst>
+              <a:ext uri="{FF2B5EF4-FFF2-40B4-BE49-F238E27FC236}">
+                <a16:creationId xmlns:a16="http://schemas.microsoft.com/office/drawing/2014/main" id="{C9862CF9-3379-4044-8FCB-67D4B3549468}"/>
+              </a:ext>
+            </a:extLst>
+          </p:cNvPr>
+          <p:cNvSpPr>
+            <a:spLocks noGrp="1"/>
+          </p:cNvSpPr>
+          <p:nvPr>
+            <p:ph idx="1"/>
+          </p:nvPr>
+        </p:nvSpPr>
+        <p:spPr/>
+        <p:txBody>
+          <a:bodyPr/>
+          <a:lstStyle/>
+          <a:p>
+            <a:r>
+              <a:rPr lang="en-US" dirty="0"/>
+              <a:t>Define what else you need to know and make up answers for those additional inputs to your calculation.</a:t>
+            </a:r>
+          </a:p>
+          <a:p>
+            <a:r>
+              <a:rPr lang="en-US" dirty="0"/>
+              <a:t>Rewrite the question so that it is clear and can be answered</a:t>
+            </a:r>
+          </a:p>
+          <a:p>
+            <a:r>
+              <a:rPr lang="en-US" dirty="0"/>
+              <a:t>Then estimate the plan view area of the clarifier for the question you have crafted</a:t>
+            </a:r>
+          </a:p>
+          <a:p>
+            <a:r>
+              <a:rPr lang="en-US" dirty="0"/>
+              <a:t>Hints:</a:t>
+            </a:r>
+          </a:p>
+          <a:p>
+            <a:pPr lvl="1"/>
+            <a:r>
+              <a:rPr lang="en-US" dirty="0"/>
+              <a:t>You can google to find out how much water people use (it is about 3 mL/s)</a:t>
+            </a:r>
+          </a:p>
+          <a:p>
+            <a:r>
+              <a:rPr lang="en-US" dirty="0"/>
+              <a:t>Type your question (do this first) and your answer into the jam board</a:t>
+            </a:r>
+          </a:p>
+          <a:p>
+            <a:pPr lvl="1"/>
+            <a:endParaRPr lang="en-US" dirty="0"/>
+          </a:p>
+          <a:p>
+            <a:endParaRPr lang="en-US" dirty="0"/>
+          </a:p>
+        </p:txBody>
+      </p:sp>
+    </p:spTree>
+    <p:extLst>
+      <p:ext uri="{BB962C8B-B14F-4D97-AF65-F5344CB8AC3E}">
+        <p14:creationId xmlns:p14="http://schemas.microsoft.com/office/powerpoint/2010/main" val="2744234735"/>
+      </p:ext>
+    </p:extLst>
+  </p:cSld>
+  <p:clrMapOvr>
+    <a:masterClrMapping/>
+  </p:clrMapOvr>
+  <p:transition>
+    <p:fade/>
+  </p:transition>
+</p:sld>
+</file>
+
 <file path=ppt/slides/slide2.xml><?xml version="1.0" encoding="utf-8"?>
 <p:sld xmlns:a="http://schemas.openxmlformats.org/drawingml/2006/main" xmlns:r="http://schemas.openxmlformats.org/officeDocument/2006/relationships" xmlns:p="http://schemas.openxmlformats.org/presentationml/2006/main">
   <p:cSld>

</xml_diff>